<commit_message>
Converted all jpg images to png
</commit_message>
<xml_diff>
--- a/src/video-05-experimental-studies.pptx
+++ b/src/video-05-experimental-studies.pptx
@@ -4500,7 +4500,7 @@
       </p:grpSpPr>
       <p:pic>
         <p:nvPicPr>
-          <p:cNvPr descr="../images/image-05-06.jpg" id="0" name="Picture 1"/>
+          <p:cNvPr descr="../images/image-05-06.png" id="0" name="Picture 1"/>
           <p:cNvPicPr>
             <a:picLocks noGrp="1" noChangeAspect="1"/>
           </p:cNvPicPr>
@@ -4514,8 +4514,8 @@
         </p:blipFill>
         <p:spPr bwMode="auto">
           <a:xfrm>
-            <a:off x="1181100" y="1600200"/>
-            <a:ext cx="6781800" cy="4521200"/>
+            <a:off x="1562100" y="1600200"/>
+            <a:ext cx="6019800" cy="4521200"/>
           </a:xfrm>
           <a:prstGeom prst="rect">
             <a:avLst/>
@@ -5647,7 +5647,7 @@
       </p:grpSpPr>
       <p:pic>
         <p:nvPicPr>
-          <p:cNvPr descr="../images/image-05-08.jpg" id="0" name="Picture 1"/>
+          <p:cNvPr descr="../images/image-05-08.png" id="0" name="Picture 1"/>
           <p:cNvPicPr>
             <a:picLocks noGrp="1" noChangeAspect="1"/>
           </p:cNvPicPr>

</xml_diff>